<commit_message>
Add LANL to licencse.
</commit_message>
<xml_diff>
--- a/presentations/SC20-reproducibility.pptx
+++ b/presentations/SC20-reproducibility.pptx
@@ -284,7 +284,7 @@
           <a:p>
             <a:fld id="{0B842F42-2CE9-4E35-95C1-410DC08A50B1}" type="datetimeFigureOut">
               <a:rPr lang="en-US" smtClean="0"/>
-              <a:t>9/2/2020</a:t>
+              <a:t>8/2/2020</a:t>
             </a:fld>
             <a:endParaRPr lang="en-US"/>
           </a:p>
@@ -449,7 +449,7 @@
           <a:p>
             <a:fld id="{6F282904-F315-4730-8D91-37D99E141A6F}" type="datetimeFigureOut">
               <a:rPr lang="en-US" smtClean="0"/>
-              <a:t>9/2/2020</a:t>
+              <a:t>8/2/2020</a:t>
             </a:fld>
             <a:endParaRPr lang="en-US"/>
           </a:p>
@@ -4811,7 +4811,7 @@
 </file>
 
 <file path=ppt/slides/slide14.xml><?xml version="1.0" encoding="utf-8"?>
-<p:sld xmlns:a="http://schemas.openxmlformats.org/drawingml/2006/main" xmlns:r="http://schemas.openxmlformats.org/officeDocument/2006/relationships" xmlns:p="http://schemas.openxmlformats.org/presentationml/2006/main" show="0">
+<p:sld xmlns:a="http://schemas.openxmlformats.org/drawingml/2006/main" xmlns:r="http://schemas.openxmlformats.org/officeDocument/2006/relationships" xmlns:p="http://schemas.openxmlformats.org/presentationml/2006/main">
   <p:cSld>
     <p:spTree>
       <p:nvGrpSpPr>
@@ -5090,7 +5090,7 @@
 </file>
 
 <file path=ppt/slides/slide15.xml><?xml version="1.0" encoding="utf-8"?>
-<p:sld xmlns:a="http://schemas.openxmlformats.org/drawingml/2006/main" xmlns:r="http://schemas.openxmlformats.org/officeDocument/2006/relationships" xmlns:p="http://schemas.openxmlformats.org/presentationml/2006/main" show="0">
+<p:sld xmlns:a="http://schemas.openxmlformats.org/drawingml/2006/main" xmlns:r="http://schemas.openxmlformats.org/officeDocument/2006/relationships" xmlns:p="http://schemas.openxmlformats.org/presentationml/2006/main">
   <p:cSld>
     <p:spTree>
       <p:nvGrpSpPr>
@@ -7090,7 +7090,7 @@
 </file>
 
 <file path=ppt/slides/slide22.xml><?xml version="1.0" encoding="utf-8"?>
-<p:sld xmlns:a="http://schemas.openxmlformats.org/drawingml/2006/main" xmlns:r="http://schemas.openxmlformats.org/officeDocument/2006/relationships" xmlns:p="http://schemas.openxmlformats.org/presentationml/2006/main" show="0">
+<p:sld xmlns:a="http://schemas.openxmlformats.org/drawingml/2006/main" xmlns:r="http://schemas.openxmlformats.org/officeDocument/2006/relationships" xmlns:p="http://schemas.openxmlformats.org/presentationml/2006/main">
   <p:cSld>
     <p:spTree>
       <p:nvGrpSpPr>
@@ -7251,7 +7251,7 @@
 </file>
 
 <file path=ppt/slides/slide23.xml><?xml version="1.0" encoding="utf-8"?>
-<p:sld xmlns:a="http://schemas.openxmlformats.org/drawingml/2006/main" xmlns:r="http://schemas.openxmlformats.org/officeDocument/2006/relationships" xmlns:p="http://schemas.openxmlformats.org/presentationml/2006/main" show="0">
+<p:sld xmlns:a="http://schemas.openxmlformats.org/drawingml/2006/main" xmlns:r="http://schemas.openxmlformats.org/officeDocument/2006/relationships" xmlns:p="http://schemas.openxmlformats.org/presentationml/2006/main">
   <p:cSld>
     <p:spTree>
       <p:nvGrpSpPr>
@@ -8354,7 +8354,7 @@
 </file>
 
 <file path=ppt/slides/slide28.xml><?xml version="1.0" encoding="utf-8"?>
-<p:sld xmlns:a="http://schemas.openxmlformats.org/drawingml/2006/main" xmlns:r="http://schemas.openxmlformats.org/officeDocument/2006/relationships" xmlns:p="http://schemas.openxmlformats.org/presentationml/2006/main" show="0">
+<p:sld xmlns:a="http://schemas.openxmlformats.org/drawingml/2006/main" xmlns:r="http://schemas.openxmlformats.org/officeDocument/2006/relationships" xmlns:p="http://schemas.openxmlformats.org/presentationml/2006/main">
   <p:cSld>
     <p:spTree>
       <p:nvGrpSpPr>
@@ -9128,7 +9128,7 @@
 </file>
 
 <file path=ppt/slides/slide4.xml><?xml version="1.0" encoding="utf-8"?>
-<p:sld xmlns:a="http://schemas.openxmlformats.org/drawingml/2006/main" xmlns:r="http://schemas.openxmlformats.org/officeDocument/2006/relationships" xmlns:p="http://schemas.openxmlformats.org/presentationml/2006/main" show="0">
+<p:sld xmlns:a="http://schemas.openxmlformats.org/drawingml/2006/main" xmlns:r="http://schemas.openxmlformats.org/officeDocument/2006/relationships" xmlns:p="http://schemas.openxmlformats.org/presentationml/2006/main">
   <p:cSld>
     <p:spTree>
       <p:nvGrpSpPr>
@@ -9860,7 +9860,7 @@
 </file>
 
 <file path=ppt/slides/slide7.xml><?xml version="1.0" encoding="utf-8"?>
-<p:sld xmlns:a="http://schemas.openxmlformats.org/drawingml/2006/main" xmlns:r="http://schemas.openxmlformats.org/officeDocument/2006/relationships" xmlns:p="http://schemas.openxmlformats.org/presentationml/2006/main" show="0">
+<p:sld xmlns:a="http://schemas.openxmlformats.org/drawingml/2006/main" xmlns:r="http://schemas.openxmlformats.org/officeDocument/2006/relationships" xmlns:p="http://schemas.openxmlformats.org/presentationml/2006/main">
   <p:cSld>
     <p:spTree>
       <p:nvGrpSpPr>
@@ -10120,7 +10120,7 @@
 </file>
 
 <file path=ppt/slides/slide8.xml><?xml version="1.0" encoding="utf-8"?>
-<p:sld xmlns:a="http://schemas.openxmlformats.org/drawingml/2006/main" xmlns:r="http://schemas.openxmlformats.org/officeDocument/2006/relationships" xmlns:p="http://schemas.openxmlformats.org/presentationml/2006/main" show="0">
+<p:sld xmlns:a="http://schemas.openxmlformats.org/drawingml/2006/main" xmlns:r="http://schemas.openxmlformats.org/officeDocument/2006/relationships" xmlns:p="http://schemas.openxmlformats.org/presentationml/2006/main">
   <p:cSld>
     <p:spTree>
       <p:nvGrpSpPr>
@@ -11558,12 +11558,9 @@
 </file>
 
 <file path=customXml/item1.xml><?xml version="1.0" encoding="utf-8"?>
-<?mso-contentType ?>
-<FormTemplates xmlns="http://schemas.microsoft.com/sharepoint/v3/contenttype/forms">
-  <Display>DocumentLibraryForm</Display>
-  <Edit>DocumentLibraryForm</Edit>
-  <New>DocumentLibraryForm</New>
-</FormTemplates>
+<p:properties xmlns:p="http://schemas.microsoft.com/office/2006/metadata/properties" xmlns:xsi="http://www.w3.org/2001/XMLSchema-instance" xmlns:pc="http://schemas.microsoft.com/office/infopath/2007/PartnerControls">
+  <documentManagement/>
+</p:properties>
 </file>
 
 <file path=customXml/item2.xml><?xml version="1.0" encoding="utf-8"?>
@@ -11616,15 +11613,25 @@
 </file>
 
 <file path=customXml/item3.xml><?xml version="1.0" encoding="utf-8"?>
-<p:properties xmlns:p="http://schemas.microsoft.com/office/2006/metadata/properties" xmlns:xsi="http://www.w3.org/2001/XMLSchema-instance" xmlns:pc="http://schemas.microsoft.com/office/infopath/2007/PartnerControls">
-  <documentManagement/>
-</p:properties>
+<?mso-contentType ?>
+<FormTemplates xmlns="http://schemas.microsoft.com/sharepoint/v3/contenttype/forms">
+  <Display>DocumentLibraryForm</Display>
+  <Edit>DocumentLibraryForm</Edit>
+  <New>DocumentLibraryForm</New>
+</FormTemplates>
 </file>
 
 <file path=customXml/itemProps1.xml><?xml version="1.0" encoding="utf-8"?>
-<ds:datastoreItem xmlns:ds="http://schemas.openxmlformats.org/officeDocument/2006/customXml" ds:itemID="{19E20559-B232-4371-8690-E3D8007EDB82}">
+<ds:datastoreItem xmlns:ds="http://schemas.openxmlformats.org/officeDocument/2006/customXml" ds:itemID="{A50EC660-24D0-43A0-AE5E-E274115E726B}">
   <ds:schemaRefs>
-    <ds:schemaRef ds:uri="http://schemas.microsoft.com/sharepoint/v3/contenttype/forms"/>
+    <ds:schemaRef ds:uri="http://purl.org/dc/terms/"/>
+    <ds:schemaRef ds:uri="http://schemas.openxmlformats.org/package/2006/metadata/core-properties"/>
+    <ds:schemaRef ds:uri="http://schemas.microsoft.com/office/2006/documentManagement/types"/>
+    <ds:schemaRef ds:uri="http://purl.org/dc/elements/1.1/"/>
+    <ds:schemaRef ds:uri="http://schemas.microsoft.com/office/2006/metadata/properties"/>
+    <ds:schemaRef ds:uri="http://www.w3.org/XML/1998/namespace"/>
+    <ds:schemaRef ds:uri="http://purl.org/dc/dcmitype/"/>
+    <ds:schemaRef ds:uri="http://schemas.microsoft.com/office/infopath/2007/PartnerControls"/>
   </ds:schemaRefs>
 </ds:datastoreItem>
 </file>
@@ -11645,16 +11652,9 @@
 </file>
 
 <file path=customXml/itemProps3.xml><?xml version="1.0" encoding="utf-8"?>
-<ds:datastoreItem xmlns:ds="http://schemas.openxmlformats.org/officeDocument/2006/customXml" ds:itemID="{A50EC660-24D0-43A0-AE5E-E274115E726B}">
+<ds:datastoreItem xmlns:ds="http://schemas.openxmlformats.org/officeDocument/2006/customXml" ds:itemID="{19E20559-B232-4371-8690-E3D8007EDB82}">
   <ds:schemaRefs>
-    <ds:schemaRef ds:uri="http://purl.org/dc/terms/"/>
-    <ds:schemaRef ds:uri="http://schemas.openxmlformats.org/package/2006/metadata/core-properties"/>
-    <ds:schemaRef ds:uri="http://schemas.microsoft.com/office/2006/documentManagement/types"/>
-    <ds:schemaRef ds:uri="http://purl.org/dc/elements/1.1/"/>
-    <ds:schemaRef ds:uri="http://schemas.microsoft.com/office/2006/metadata/properties"/>
-    <ds:schemaRef ds:uri="http://www.w3.org/XML/1998/namespace"/>
-    <ds:schemaRef ds:uri="http://purl.org/dc/dcmitype/"/>
-    <ds:schemaRef ds:uri="http://schemas.microsoft.com/office/infopath/2007/PartnerControls"/>
+    <ds:schemaRef ds:uri="http://schemas.microsoft.com/sharepoint/v3/contenttype/forms"/>
   </ds:schemaRefs>
 </ds:datastoreItem>
 </file>
</xml_diff>

<commit_message>
Update SC reproducibility, minor change to git.
</commit_message>
<xml_diff>
--- a/presentations/SC20-reproducibility.pptx
+++ b/presentations/SC20-reproducibility.pptx
@@ -5,10 +5,10 @@
     <p:sldMasterId id="2147483935" r:id="rId4"/>
   </p:sldMasterIdLst>
   <p:notesMasterIdLst>
-    <p:notesMasterId r:id="rId37"/>
+    <p:notesMasterId r:id="rId38"/>
   </p:notesMasterIdLst>
   <p:handoutMasterIdLst>
-    <p:handoutMasterId r:id="rId38"/>
+    <p:handoutMasterId r:id="rId39"/>
   </p:handoutMasterIdLst>
   <p:sldIdLst>
     <p:sldId id="318" r:id="rId5"/>
@@ -36,13 +36,14 @@
     <p:sldId id="1842" r:id="rId27"/>
     <p:sldId id="1830" r:id="rId28"/>
     <p:sldId id="1844" r:id="rId29"/>
-    <p:sldId id="1841" r:id="rId30"/>
-    <p:sldId id="1806" r:id="rId31"/>
-    <p:sldId id="1807" r:id="rId32"/>
-    <p:sldId id="1811" r:id="rId33"/>
-    <p:sldId id="313" r:id="rId34"/>
-    <p:sldId id="1836" r:id="rId35"/>
-    <p:sldId id="1837" r:id="rId36"/>
+    <p:sldId id="1845" r:id="rId30"/>
+    <p:sldId id="1841" r:id="rId31"/>
+    <p:sldId id="1806" r:id="rId32"/>
+    <p:sldId id="1807" r:id="rId33"/>
+    <p:sldId id="1811" r:id="rId34"/>
+    <p:sldId id="313" r:id="rId35"/>
+    <p:sldId id="1836" r:id="rId36"/>
+    <p:sldId id="1837" r:id="rId37"/>
   </p:sldIdLst>
   <p:sldSz cx="12188825" cy="6858000"/>
   <p:notesSz cx="7010400" cy="9296400"/>
@@ -286,7 +287,7 @@
           <a:p>
             <a:fld id="{0B842F42-2CE9-4E35-95C1-410DC08A50B1}" type="datetimeFigureOut">
               <a:rPr lang="en-US" smtClean="0"/>
-              <a:t>9/29/20</a:t>
+              <a:t>10/1/20</a:t>
             </a:fld>
             <a:endParaRPr lang="en-US"/>
           </a:p>
@@ -451,7 +452,7 @@
           <a:p>
             <a:fld id="{6F282904-F315-4730-8D91-37D99E141A6F}" type="datetimeFigureOut">
               <a:rPr lang="en-US" smtClean="0"/>
-              <a:t>9/29/20</a:t>
+              <a:t>10/1/20</a:t>
             </a:fld>
             <a:endParaRPr lang="en-US"/>
           </a:p>
@@ -1370,6 +1371,90 @@
     <p:extLst>
       <p:ext uri="{BB962C8B-B14F-4D97-AF65-F5344CB8AC3E}">
         <p14:creationId xmlns:p14="http://schemas.microsoft.com/office/powerpoint/2010/main" val="2638610629"/>
+      </p:ext>
+    </p:extLst>
+  </p:cSld>
+  <p:clrMapOvr>
+    <a:masterClrMapping/>
+  </p:clrMapOvr>
+</p:notes>
+</file>
+
+<file path=ppt/notesSlides/notesSlide6.xml><?xml version="1.0" encoding="utf-8"?>
+<p:notes xmlns:a="http://schemas.openxmlformats.org/drawingml/2006/main" xmlns:r="http://schemas.openxmlformats.org/officeDocument/2006/relationships" xmlns:p="http://schemas.openxmlformats.org/presentationml/2006/main">
+  <p:cSld>
+    <p:spTree>
+      <p:nvGrpSpPr>
+        <p:cNvPr id="1" name=""/>
+        <p:cNvGrpSpPr/>
+        <p:nvPr/>
+      </p:nvGrpSpPr>
+      <p:grpSpPr>
+        <a:xfrm>
+          <a:off x="0" y="0"/>
+          <a:ext cx="0" cy="0"/>
+          <a:chOff x="0" y="0"/>
+          <a:chExt cx="0" cy="0"/>
+        </a:xfrm>
+      </p:grpSpPr>
+      <p:sp>
+        <p:nvSpPr>
+          <p:cNvPr id="2" name="Slide Image Placeholder 1"/>
+          <p:cNvSpPr>
+            <a:spLocks noGrp="1" noRot="1" noChangeAspect="1"/>
+          </p:cNvSpPr>
+          <p:nvPr>
+            <p:ph type="sldImg"/>
+          </p:nvPr>
+        </p:nvSpPr>
+        <p:spPr/>
+      </p:sp>
+      <p:sp>
+        <p:nvSpPr>
+          <p:cNvPr id="3" name="Notes Placeholder 2"/>
+          <p:cNvSpPr>
+            <a:spLocks noGrp="1"/>
+          </p:cNvSpPr>
+          <p:nvPr>
+            <p:ph type="body" idx="1"/>
+          </p:nvPr>
+        </p:nvSpPr>
+        <p:spPr/>
+        <p:txBody>
+          <a:bodyPr/>
+          <a:lstStyle/>
+          <a:p>
+            <a:endParaRPr lang="en-US" dirty="0"/>
+          </a:p>
+        </p:txBody>
+      </p:sp>
+      <p:sp>
+        <p:nvSpPr>
+          <p:cNvPr id="4" name="Slide Number Placeholder 3"/>
+          <p:cNvSpPr>
+            <a:spLocks noGrp="1"/>
+          </p:cNvSpPr>
+          <p:nvPr>
+            <p:ph type="sldNum" sz="quarter" idx="5"/>
+          </p:nvPr>
+        </p:nvSpPr>
+        <p:spPr/>
+        <p:txBody>
+          <a:bodyPr/>
+          <a:lstStyle/>
+          <a:p>
+            <a:fld id="{54E672D7-8E2D-4611-973D-F4591A707C34}" type="slidenum">
+              <a:rPr lang="en-US" smtClean="0"/>
+              <a:t>22</a:t>
+            </a:fld>
+            <a:endParaRPr lang="en-US"/>
+          </a:p>
+        </p:txBody>
+      </p:sp>
+    </p:spTree>
+    <p:extLst>
+      <p:ext uri="{BB962C8B-B14F-4D97-AF65-F5344CB8AC3E}">
+        <p14:creationId xmlns:p14="http://schemas.microsoft.com/office/powerpoint/2010/main" val="4056182715"/>
       </p:ext>
     </p:extLst>
   </p:cSld>
@@ -4301,11 +4386,7 @@
           <a:p>
             <a:r>
               <a:rPr lang="en-US" dirty="0"/>
-              <a:t>Michael A. </a:t>
-            </a:r>
-            <a:r>
-              <a:rPr lang="en-US" dirty="0" err="1"/>
-              <a:t>Heroux</a:t>
+              <a:t>Michael A. Heroux</a:t>
             </a:r>
             <a:br>
               <a:rPr lang="en-US" sz="2000" dirty="0"/>
@@ -4317,9 +4398,18 @@
           </a:p>
           <a:p>
             <a:r>
+              <a:rPr lang="en-US" dirty="0"/>
+              <a:t>Better Scientific Software Tutorial, SC20, November 2020</a:t>
+            </a:r>
+          </a:p>
+          <a:p>
+            <a:br>
               <a:rPr lang="en-US" sz="2000" dirty="0"/>
-              <a:t>Software Productivity Track, ATPESC 2020</a:t>
-            </a:r>
+            </a:br>
+            <a:endParaRPr lang="en-US" sz="2000" dirty="0"/>
+          </a:p>
+          <a:p>
+            <a:endParaRPr lang="en-US" sz="2000" dirty="0"/>
           </a:p>
         </p:txBody>
       </p:sp>
@@ -5173,6 +5263,10 @@
           </p:nvPr>
         </p:nvSpPr>
         <p:spPr>
+          <a:xfrm>
+            <a:off x="380048" y="1737360"/>
+            <a:ext cx="11369809" cy="4047778"/>
+          </a:xfrm>
           <a:prstGeom prst="rect">
             <a:avLst/>
           </a:prstGeom>
@@ -5368,16 +5462,33 @@
             </a:r>
           </a:p>
           <a:p>
-            <a:r>
-              <a:rPr lang="en-US" dirty="0"/>
-              <a:t>Reproducibility and transparency Initiatives</a:t>
-            </a:r>
-          </a:p>
-          <a:p>
             <a:pPr lvl="1"/>
             <a:r>
               <a:rPr lang="en-US" dirty="0"/>
-              <a:t>Increasing implementations for publications (SC, ACM and more)</a:t>
+              <a:t>Example NSF policy on dissemination of results and sharing data</a:t>
+            </a:r>
+          </a:p>
+          <a:p>
+            <a:r>
+              <a:rPr lang="en-US" dirty="0"/>
+              <a:t>Fair data principles for maximum use of research data</a:t>
+            </a:r>
+          </a:p>
+          <a:p>
+            <a:pPr lvl="1"/>
+            <a:endParaRPr lang="en-US" dirty="0"/>
+          </a:p>
+          <a:p>
+            <a:r>
+              <a:rPr lang="en-US" dirty="0"/>
+              <a:t>Reproducibility and transparency Initiatives by Publications</a:t>
+            </a:r>
+          </a:p>
+          <a:p>
+            <a:pPr lvl="1"/>
+            <a:r>
+              <a:rPr lang="en-US" dirty="0"/>
+              <a:t>Increasing requirements for publications (SC, ACM and more)</a:t>
             </a:r>
           </a:p>
           <a:p>
@@ -5392,7 +5503,16 @@
             </a:pPr>
             <a:r>
               <a:rPr lang="en-US" sz="2400" dirty="0"/>
-              <a:t>See: Initiatives for Data Management and Publication at the end of these slides</a:t>
+              <a:t>See Appendix:</a:t>
+            </a:r>
+          </a:p>
+          <a:p>
+            <a:pPr marL="346075" lvl="1" indent="0">
+              <a:buNone/>
+            </a:pPr>
+            <a:r>
+              <a:rPr lang="en-US" sz="2400" dirty="0"/>
+              <a:t>Requirement Initiatives for Data Management and Publication</a:t>
             </a:r>
           </a:p>
         </p:txBody>
@@ -6068,7 +6188,7 @@
             </a:r>
             <a:r>
               <a:rPr lang="en-US" dirty="0"/>
-              <a:t> (1/3)</a:t>
+              <a:t> (1/2)</a:t>
             </a:r>
           </a:p>
         </p:txBody>
@@ -6244,7 +6364,7 @@
             </a:r>
             <a:r>
               <a:rPr lang="en-US" dirty="0"/>
-              <a:t> (2/3)</a:t>
+              <a:t> (2/2)</a:t>
             </a:r>
           </a:p>
         </p:txBody>
@@ -8273,7 +8393,7 @@
           <a:p>
             <a:r>
               <a:rPr lang="en-US" dirty="0"/>
-              <a:t>Initiatives for Data Management and Publication</a:t>
+              <a:t>Appendix</a:t>
             </a:r>
           </a:p>
         </p:txBody>
@@ -8317,6 +8437,89 @@
 </file>
 
 <file path=ppt/slides/slide26.xml><?xml version="1.0" encoding="utf-8"?>
+<p:sld xmlns:a="http://schemas.openxmlformats.org/drawingml/2006/main" xmlns:r="http://schemas.openxmlformats.org/officeDocument/2006/relationships" xmlns:p="http://schemas.openxmlformats.org/presentationml/2006/main">
+  <p:cSld>
+    <p:spTree>
+      <p:nvGrpSpPr>
+        <p:cNvPr id="1" name=""/>
+        <p:cNvGrpSpPr/>
+        <p:nvPr/>
+      </p:nvGrpSpPr>
+      <p:grpSpPr>
+        <a:xfrm>
+          <a:off x="0" y="0"/>
+          <a:ext cx="0" cy="0"/>
+          <a:chOff x="0" y="0"/>
+          <a:chExt cx="0" cy="0"/>
+        </a:xfrm>
+      </p:grpSpPr>
+      <p:sp>
+        <p:nvSpPr>
+          <p:cNvPr id="2" name="Title 1">
+            <a:extLst>
+              <a:ext uri="{FF2B5EF4-FFF2-40B4-BE49-F238E27FC236}">
+                <a16:creationId xmlns:a16="http://schemas.microsoft.com/office/drawing/2014/main" id="{741C6884-C6AA-FE48-AE95-62434E5C1F6B}"/>
+              </a:ext>
+            </a:extLst>
+          </p:cNvPr>
+          <p:cNvSpPr>
+            <a:spLocks noGrp="1"/>
+          </p:cNvSpPr>
+          <p:nvPr>
+            <p:ph type="title"/>
+          </p:nvPr>
+        </p:nvSpPr>
+        <p:spPr/>
+        <p:txBody>
+          <a:bodyPr/>
+          <a:lstStyle/>
+          <a:p>
+            <a:r>
+              <a:rPr lang="en-US" dirty="0"/>
+              <a:t>Requirement Initiatives for Data Management and Publication</a:t>
+            </a:r>
+          </a:p>
+        </p:txBody>
+      </p:sp>
+      <p:sp>
+        <p:nvSpPr>
+          <p:cNvPr id="3" name="Content Placeholder 2">
+            <a:extLst>
+              <a:ext uri="{FF2B5EF4-FFF2-40B4-BE49-F238E27FC236}">
+                <a16:creationId xmlns:a16="http://schemas.microsoft.com/office/drawing/2014/main" id="{E7FD0E5D-67BF-1245-932A-5CBC55AF586C}"/>
+              </a:ext>
+            </a:extLst>
+          </p:cNvPr>
+          <p:cNvSpPr>
+            <a:spLocks noGrp="1"/>
+          </p:cNvSpPr>
+          <p:nvPr>
+            <p:ph idx="1"/>
+          </p:nvPr>
+        </p:nvSpPr>
+        <p:spPr/>
+        <p:txBody>
+          <a:bodyPr/>
+          <a:lstStyle/>
+          <a:p>
+            <a:endParaRPr lang="en-US" dirty="0"/>
+          </a:p>
+        </p:txBody>
+      </p:sp>
+    </p:spTree>
+    <p:extLst>
+      <p:ext uri="{BB962C8B-B14F-4D97-AF65-F5344CB8AC3E}">
+        <p14:creationId xmlns:p14="http://schemas.microsoft.com/office/powerpoint/2010/main" val="3747918091"/>
+      </p:ext>
+    </p:extLst>
+  </p:cSld>
+  <p:clrMapOvr>
+    <a:masterClrMapping/>
+  </p:clrMapOvr>
+</p:sld>
+</file>
+
+<file path=ppt/slides/slide27.xml><?xml version="1.0" encoding="utf-8"?>
 <p:sld xmlns:a="http://schemas.openxmlformats.org/drawingml/2006/main" xmlns:r="http://schemas.openxmlformats.org/officeDocument/2006/relationships" xmlns:p="http://schemas.openxmlformats.org/presentationml/2006/main">
   <p:cSld>
     <p:spTree>
@@ -8691,7 +8894,7 @@
 </p:sld>
 </file>
 
-<file path=ppt/slides/slide27.xml><?xml version="1.0" encoding="utf-8"?>
+<file path=ppt/slides/slide28.xml><?xml version="1.0" encoding="utf-8"?>
 <p:sld xmlns:a="http://schemas.openxmlformats.org/drawingml/2006/main" xmlns:r="http://schemas.openxmlformats.org/officeDocument/2006/relationships" xmlns:p="http://schemas.openxmlformats.org/presentationml/2006/main">
   <p:cSld>
     <p:spTree>
@@ -8970,7 +9173,7 @@
 </p:sld>
 </file>
 
-<file path=ppt/slides/slide28.xml><?xml version="1.0" encoding="utf-8"?>
+<file path=ppt/slides/slide29.xml><?xml version="1.0" encoding="utf-8"?>
 <p:sld xmlns:a="http://schemas.openxmlformats.org/drawingml/2006/main" xmlns:r="http://schemas.openxmlformats.org/officeDocument/2006/relationships" xmlns:p="http://schemas.openxmlformats.org/presentationml/2006/main">
   <p:cSld>
     <p:spTree>
@@ -9129,232 +9332,6 @@
     <p:extLst>
       <p:ext uri="{BB962C8B-B14F-4D97-AF65-F5344CB8AC3E}">
         <p14:creationId xmlns:p14="http://schemas.microsoft.com/office/powerpoint/2010/main" val="2302033408"/>
-      </p:ext>
-    </p:extLst>
-  </p:cSld>
-  <p:clrMapOvr>
-    <a:masterClrMapping/>
-  </p:clrMapOvr>
-</p:sld>
-</file>
-
-<file path=ppt/slides/slide29.xml><?xml version="1.0" encoding="utf-8"?>
-<p:sld xmlns:a="http://schemas.openxmlformats.org/drawingml/2006/main" xmlns:r="http://schemas.openxmlformats.org/officeDocument/2006/relationships" xmlns:p="http://schemas.openxmlformats.org/presentationml/2006/main">
-  <p:cSld>
-    <p:spTree>
-      <p:nvGrpSpPr>
-        <p:cNvPr id="1" name=""/>
-        <p:cNvGrpSpPr/>
-        <p:nvPr/>
-      </p:nvGrpSpPr>
-      <p:grpSpPr>
-        <a:xfrm>
-          <a:off x="0" y="0"/>
-          <a:ext cx="0" cy="0"/>
-          <a:chOff x="0" y="0"/>
-          <a:chExt cx="0" cy="0"/>
-        </a:xfrm>
-      </p:grpSpPr>
-      <p:sp>
-        <p:nvSpPr>
-          <p:cNvPr id="2" name="Title 1"/>
-          <p:cNvSpPr>
-            <a:spLocks noGrp="1"/>
-          </p:cNvSpPr>
-          <p:nvPr>
-            <p:ph type="title"/>
-          </p:nvPr>
-        </p:nvSpPr>
-        <p:spPr>
-          <a:xfrm>
-            <a:off x="368135" y="192378"/>
-            <a:ext cx="11269682" cy="532017"/>
-          </a:xfrm>
-        </p:spPr>
-        <p:txBody>
-          <a:bodyPr>
-            <a:normAutofit/>
-          </a:bodyPr>
-          <a:lstStyle/>
-          <a:p>
-            <a:r>
-              <a:rPr lang="en-US" sz="2800" dirty="0"/>
-              <a:t>Increasing Attention on Reproducibility</a:t>
-            </a:r>
-          </a:p>
-        </p:txBody>
-      </p:sp>
-      <p:sp>
-        <p:nvSpPr>
-          <p:cNvPr id="4" name="Content Placeholder 3"/>
-          <p:cNvSpPr>
-            <a:spLocks noGrp="1"/>
-          </p:cNvSpPr>
-          <p:nvPr>
-            <p:ph sz="quarter" idx="1"/>
-          </p:nvPr>
-        </p:nvSpPr>
-        <p:spPr>
-          <a:xfrm>
-            <a:off x="245815" y="868048"/>
-            <a:ext cx="11697194" cy="5449160"/>
-          </a:xfrm>
-        </p:spPr>
-        <p:txBody>
-          <a:bodyPr>
-            <a:normAutofit lnSpcReduction="10000"/>
-          </a:bodyPr>
-          <a:lstStyle/>
-          <a:p>
-            <a:r>
-              <a:rPr lang="en-US" dirty="0"/>
-              <a:t>More publication venues are adding reproducibility </a:t>
-            </a:r>
-            <a:r>
-              <a:rPr lang="en-US" b="1" dirty="0"/>
-              <a:t>recognition</a:t>
-            </a:r>
-            <a:r>
-              <a:rPr lang="en-US" dirty="0"/>
-              <a:t> or </a:t>
-            </a:r>
-            <a:r>
-              <a:rPr lang="en-US" b="1" dirty="0"/>
-              <a:t>requirements</a:t>
-            </a:r>
-            <a:endParaRPr lang="en-US" sz="2400" dirty="0"/>
-          </a:p>
-          <a:p>
-            <a:r>
-              <a:rPr lang="en-US" sz="2400" dirty="0"/>
-              <a:t>ACM </a:t>
-            </a:r>
-            <a:r>
-              <a:rPr lang="en-US" sz="2400" strike="sngStrike" dirty="0"/>
-              <a:t>Replicated</a:t>
-            </a:r>
-            <a:r>
-              <a:rPr lang="en-US" sz="2400" dirty="0"/>
-              <a:t> Reproducible Computational Results (RCR)</a:t>
-            </a:r>
-          </a:p>
-          <a:p>
-            <a:pPr lvl="1"/>
-            <a:r>
-              <a:rPr lang="en-US" sz="2000" dirty="0"/>
-              <a:t>ACM TOMS, TOMACS</a:t>
-            </a:r>
-          </a:p>
-          <a:p>
-            <a:pPr lvl="1"/>
-            <a:r>
-              <a:rPr lang="en-US" sz="2000" dirty="0">
-                <a:hlinkClick r:id="rId2"/>
-              </a:rPr>
-              <a:t>http://toms.acm.org/replicated-computational-results.cfm</a:t>
-            </a:r>
-            <a:r>
-              <a:rPr lang="en-US" sz="2000" dirty="0"/>
-              <a:t> </a:t>
-            </a:r>
-          </a:p>
-          <a:p>
-            <a:r>
-              <a:rPr lang="en-US" sz="2400" dirty="0"/>
-              <a:t>ACM Badging</a:t>
-            </a:r>
-          </a:p>
-          <a:p>
-            <a:pPr lvl="1"/>
-            <a:r>
-              <a:rPr lang="en-US" dirty="0"/>
-              <a:t>Functional, reusable, available, replicated, reproduced</a:t>
-            </a:r>
-          </a:p>
-          <a:p>
-            <a:pPr lvl="1"/>
-            <a:r>
-              <a:rPr lang="en-US" sz="2000" dirty="0">
-                <a:hlinkClick r:id="rId3"/>
-              </a:rPr>
-              <a:t>https://www.acm.org/publications/policies/artifact-review-badging</a:t>
-            </a:r>
-            <a:r>
-              <a:rPr lang="en-US" sz="2000" dirty="0"/>
-              <a:t> </a:t>
-            </a:r>
-          </a:p>
-          <a:p>
-            <a:r>
-              <a:rPr lang="en-US" sz="2400" dirty="0"/>
-              <a:t>These conferences have artifact evaluation appendices:</a:t>
-            </a:r>
-          </a:p>
-          <a:p>
-            <a:pPr lvl="1"/>
-            <a:r>
-              <a:rPr lang="en-US" sz="2000" dirty="0"/>
-              <a:t>CGO, </a:t>
-            </a:r>
-            <a:r>
-              <a:rPr lang="en-US" sz="2000" dirty="0" err="1"/>
-              <a:t>PPoPP</a:t>
-            </a:r>
-            <a:r>
-              <a:rPr lang="en-US" sz="2000" dirty="0"/>
-              <a:t>, PACT, RTSS and SC</a:t>
-            </a:r>
-          </a:p>
-          <a:p>
-            <a:pPr lvl="1"/>
-            <a:r>
-              <a:rPr lang="en-US" sz="2000" dirty="0">
-                <a:hlinkClick r:id="rId4"/>
-              </a:rPr>
-              <a:t>http://fursin.net/reproducibility.html</a:t>
-            </a:r>
-            <a:endParaRPr lang="en-US" sz="2000" dirty="0"/>
-          </a:p>
-          <a:p>
-            <a:r>
-              <a:rPr lang="en-US" sz="2400" dirty="0"/>
-              <a:t>NISO Committee on Reproducibility and Badging</a:t>
-            </a:r>
-          </a:p>
-          <a:p>
-            <a:pPr lvl="1"/>
-            <a:r>
-              <a:rPr lang="en-US" sz="2000" dirty="0">
-                <a:hlinkClick r:id="rId5"/>
-              </a:rPr>
-              <a:t>https://www.niso.org/niso-io/2019/01/new-niso-project-badging-scheme-reproducibility-computational-and-computing</a:t>
-            </a:r>
-            <a:r>
-              <a:rPr lang="en-US" sz="2000" dirty="0"/>
-              <a:t> </a:t>
-            </a:r>
-          </a:p>
-          <a:p>
-            <a:pPr lvl="1"/>
-            <a:r>
-              <a:rPr lang="en-US" sz="2000" dirty="0"/>
-              <a:t>Publishers: ACM, IEEE, </a:t>
-            </a:r>
-            <a:r>
-              <a:rPr lang="en-US" sz="2000" dirty="0" err="1"/>
-              <a:t>figshare</a:t>
-            </a:r>
-            <a:r>
-              <a:rPr lang="en-US" sz="2000" dirty="0"/>
-              <a:t>, STM, Reed Elsevier, Springer Nature</a:t>
-            </a:r>
-          </a:p>
-        </p:txBody>
-      </p:sp>
-    </p:spTree>
-    <p:extLst>
-      <p:ext uri="{BB962C8B-B14F-4D97-AF65-F5344CB8AC3E}">
-        <p14:creationId xmlns:p14="http://schemas.microsoft.com/office/powerpoint/2010/main" val="2234428243"/>
       </p:ext>
     </p:extLst>
   </p:cSld>
@@ -9594,6 +9571,232 @@
             <p:ph type="title"/>
           </p:nvPr>
         </p:nvSpPr>
+        <p:spPr>
+          <a:xfrm>
+            <a:off x="368135" y="192378"/>
+            <a:ext cx="11269682" cy="532017"/>
+          </a:xfrm>
+        </p:spPr>
+        <p:txBody>
+          <a:bodyPr>
+            <a:normAutofit/>
+          </a:bodyPr>
+          <a:lstStyle/>
+          <a:p>
+            <a:r>
+              <a:rPr lang="en-US" sz="2800" dirty="0"/>
+              <a:t>Increasing Attention on Reproducibility</a:t>
+            </a:r>
+          </a:p>
+        </p:txBody>
+      </p:sp>
+      <p:sp>
+        <p:nvSpPr>
+          <p:cNvPr id="4" name="Content Placeholder 3"/>
+          <p:cNvSpPr>
+            <a:spLocks noGrp="1"/>
+          </p:cNvSpPr>
+          <p:nvPr>
+            <p:ph sz="quarter" idx="1"/>
+          </p:nvPr>
+        </p:nvSpPr>
+        <p:spPr>
+          <a:xfrm>
+            <a:off x="245815" y="868048"/>
+            <a:ext cx="11697194" cy="5449160"/>
+          </a:xfrm>
+        </p:spPr>
+        <p:txBody>
+          <a:bodyPr>
+            <a:normAutofit lnSpcReduction="10000"/>
+          </a:bodyPr>
+          <a:lstStyle/>
+          <a:p>
+            <a:r>
+              <a:rPr lang="en-US" dirty="0"/>
+              <a:t>More publication venues are adding reproducibility </a:t>
+            </a:r>
+            <a:r>
+              <a:rPr lang="en-US" b="1" dirty="0"/>
+              <a:t>recognition</a:t>
+            </a:r>
+            <a:r>
+              <a:rPr lang="en-US" dirty="0"/>
+              <a:t> or </a:t>
+            </a:r>
+            <a:r>
+              <a:rPr lang="en-US" b="1" dirty="0"/>
+              <a:t>requirements</a:t>
+            </a:r>
+            <a:endParaRPr lang="en-US" sz="2400" dirty="0"/>
+          </a:p>
+          <a:p>
+            <a:r>
+              <a:rPr lang="en-US" sz="2400" dirty="0"/>
+              <a:t>ACM </a:t>
+            </a:r>
+            <a:r>
+              <a:rPr lang="en-US" sz="2400" strike="sngStrike" dirty="0"/>
+              <a:t>Replicated</a:t>
+            </a:r>
+            <a:r>
+              <a:rPr lang="en-US" sz="2400" dirty="0"/>
+              <a:t> Reproducible Computational Results (RCR)</a:t>
+            </a:r>
+          </a:p>
+          <a:p>
+            <a:pPr lvl="1"/>
+            <a:r>
+              <a:rPr lang="en-US" sz="2000" dirty="0"/>
+              <a:t>ACM TOMS, TOMACS</a:t>
+            </a:r>
+          </a:p>
+          <a:p>
+            <a:pPr lvl="1"/>
+            <a:r>
+              <a:rPr lang="en-US" sz="2000" dirty="0">
+                <a:hlinkClick r:id="rId2"/>
+              </a:rPr>
+              <a:t>http://toms.acm.org/replicated-computational-results.cfm</a:t>
+            </a:r>
+            <a:r>
+              <a:rPr lang="en-US" sz="2000" dirty="0"/>
+              <a:t> </a:t>
+            </a:r>
+          </a:p>
+          <a:p>
+            <a:r>
+              <a:rPr lang="en-US" sz="2400" dirty="0"/>
+              <a:t>ACM Badging</a:t>
+            </a:r>
+          </a:p>
+          <a:p>
+            <a:pPr lvl="1"/>
+            <a:r>
+              <a:rPr lang="en-US" dirty="0"/>
+              <a:t>Functional, reusable, available, replicated, reproduced</a:t>
+            </a:r>
+          </a:p>
+          <a:p>
+            <a:pPr lvl="1"/>
+            <a:r>
+              <a:rPr lang="en-US" sz="2000" dirty="0">
+                <a:hlinkClick r:id="rId3"/>
+              </a:rPr>
+              <a:t>https://www.acm.org/publications/policies/artifact-review-badging</a:t>
+            </a:r>
+            <a:r>
+              <a:rPr lang="en-US" sz="2000" dirty="0"/>
+              <a:t> </a:t>
+            </a:r>
+          </a:p>
+          <a:p>
+            <a:r>
+              <a:rPr lang="en-US" sz="2400" dirty="0"/>
+              <a:t>These conferences have artifact evaluation appendices:</a:t>
+            </a:r>
+          </a:p>
+          <a:p>
+            <a:pPr lvl="1"/>
+            <a:r>
+              <a:rPr lang="en-US" sz="2000" dirty="0"/>
+              <a:t>CGO, </a:t>
+            </a:r>
+            <a:r>
+              <a:rPr lang="en-US" sz="2000" dirty="0" err="1"/>
+              <a:t>PPoPP</a:t>
+            </a:r>
+            <a:r>
+              <a:rPr lang="en-US" sz="2000" dirty="0"/>
+              <a:t>, PACT, RTSS and SC</a:t>
+            </a:r>
+          </a:p>
+          <a:p>
+            <a:pPr lvl="1"/>
+            <a:r>
+              <a:rPr lang="en-US" sz="2000" dirty="0">
+                <a:hlinkClick r:id="rId4"/>
+              </a:rPr>
+              <a:t>http://fursin.net/reproducibility.html</a:t>
+            </a:r>
+            <a:endParaRPr lang="en-US" sz="2000" dirty="0"/>
+          </a:p>
+          <a:p>
+            <a:r>
+              <a:rPr lang="en-US" sz="2400" dirty="0"/>
+              <a:t>NISO Committee on Reproducibility and Badging</a:t>
+            </a:r>
+          </a:p>
+          <a:p>
+            <a:pPr lvl="1"/>
+            <a:r>
+              <a:rPr lang="en-US" sz="2000" dirty="0">
+                <a:hlinkClick r:id="rId5"/>
+              </a:rPr>
+              <a:t>https://www.niso.org/niso-io/2019/01/new-niso-project-badging-scheme-reproducibility-computational-and-computing</a:t>
+            </a:r>
+            <a:r>
+              <a:rPr lang="en-US" sz="2000" dirty="0"/>
+              <a:t> </a:t>
+            </a:r>
+          </a:p>
+          <a:p>
+            <a:pPr lvl="1"/>
+            <a:r>
+              <a:rPr lang="en-US" sz="2000" dirty="0"/>
+              <a:t>Publishers: ACM, IEEE, </a:t>
+            </a:r>
+            <a:r>
+              <a:rPr lang="en-US" sz="2000" dirty="0" err="1"/>
+              <a:t>figshare</a:t>
+            </a:r>
+            <a:r>
+              <a:rPr lang="en-US" sz="2000" dirty="0"/>
+              <a:t>, STM, Reed Elsevier, Springer Nature</a:t>
+            </a:r>
+          </a:p>
+        </p:txBody>
+      </p:sp>
+    </p:spTree>
+    <p:extLst>
+      <p:ext uri="{BB962C8B-B14F-4D97-AF65-F5344CB8AC3E}">
+        <p14:creationId xmlns:p14="http://schemas.microsoft.com/office/powerpoint/2010/main" val="2234428243"/>
+      </p:ext>
+    </p:extLst>
+  </p:cSld>
+  <p:clrMapOvr>
+    <a:masterClrMapping/>
+  </p:clrMapOvr>
+</p:sld>
+</file>
+
+<file path=ppt/slides/slide31.xml><?xml version="1.0" encoding="utf-8"?>
+<p:sld xmlns:a="http://schemas.openxmlformats.org/drawingml/2006/main" xmlns:r="http://schemas.openxmlformats.org/officeDocument/2006/relationships" xmlns:p="http://schemas.openxmlformats.org/presentationml/2006/main">
+  <p:cSld>
+    <p:spTree>
+      <p:nvGrpSpPr>
+        <p:cNvPr id="1" name=""/>
+        <p:cNvGrpSpPr/>
+        <p:nvPr/>
+      </p:nvGrpSpPr>
+      <p:grpSpPr>
+        <a:xfrm>
+          <a:off x="0" y="0"/>
+          <a:ext cx="0" cy="0"/>
+          <a:chOff x="0" y="0"/>
+          <a:chExt cx="0" cy="0"/>
+        </a:xfrm>
+      </p:grpSpPr>
+      <p:sp>
+        <p:nvSpPr>
+          <p:cNvPr id="2" name="Title 1"/>
+          <p:cNvSpPr>
+            <a:spLocks noGrp="1"/>
+          </p:cNvSpPr>
+          <p:nvPr>
+            <p:ph type="title"/>
+          </p:nvPr>
+        </p:nvSpPr>
         <p:spPr/>
         <p:txBody>
           <a:bodyPr/>
@@ -9776,7 +9979,7 @@
 </p:sld>
 </file>
 
-<file path=ppt/slides/slide31.xml><?xml version="1.0" encoding="utf-8"?>
+<file path=ppt/slides/slide32.xml><?xml version="1.0" encoding="utf-8"?>
 <p:sld xmlns:a="http://schemas.openxmlformats.org/drawingml/2006/main" xmlns:r="http://schemas.openxmlformats.org/officeDocument/2006/relationships" xmlns:p="http://schemas.openxmlformats.org/presentationml/2006/main">
   <p:cSld>
     <p:spTree>
@@ -9937,7 +10140,7 @@
 </p:sld>
 </file>
 
-<file path=ppt/slides/slide32.xml><?xml version="1.0" encoding="utf-8"?>
+<file path=ppt/slides/slide33.xml><?xml version="1.0" encoding="utf-8"?>
 <p:sld xmlns:a="http://schemas.openxmlformats.org/drawingml/2006/main" xmlns:r="http://schemas.openxmlformats.org/officeDocument/2006/relationships" xmlns:p="http://schemas.openxmlformats.org/presentationml/2006/main">
   <p:cSld>
     <p:spTree>
@@ -11394,7 +11597,19 @@
             </a:pPr>
             <a:r>
               <a:rPr lang="en-US" sz="2400" i="1" dirty="0"/>
-              <a:t>For Palmer, the ordeal exemplifies the importance of transparency in scientific research, an issue that has recently drawn heightened attention in the science community. “One of the real travesties,” he says, is that “there’s no way you could have reproduced [the Berkeley team’s] algorithm—the way they had implemented their code—from reading their paper.” Presumably, he adds, “if this had been disclosed, this saga might not have gone on for seven years.”</a:t>
+              <a:t>For Palmer, the ordeal exemplifies the importance of transparency in scientific research, an issue that has recently drawn heightened attention in the science community. “One of the real travesties,” he says, is that </a:t>
+            </a:r>
+            <a:r>
+              <a:rPr lang="en-US" sz="2400" i="1" dirty="0">
+                <a:highlight>
+                  <a:srgbClr val="FFFF00"/>
+                </a:highlight>
+              </a:rPr>
+              <a:t>“there’s no way you could have reproduced [the Berkeley team’s] algorithm—the way they had implemented their code—from reading their paper.”</a:t>
+            </a:r>
+            <a:r>
+              <a:rPr lang="en-US" sz="2400" i="1" dirty="0"/>
+              <a:t> Presumably, he adds, “if this had been disclosed, this saga might not have gone on for seven years.”</a:t>
             </a:r>
           </a:p>
         </p:txBody>
@@ -12632,6 +12847,12 @@
 </file>
 
 <file path=customXml/item1.xml><?xml version="1.0" encoding="utf-8"?>
+<p:properties xmlns:p="http://schemas.microsoft.com/office/2006/metadata/properties" xmlns:xsi="http://www.w3.org/2001/XMLSchema-instance" xmlns:pc="http://schemas.microsoft.com/office/infopath/2007/PartnerControls">
+  <documentManagement/>
+</p:properties>
+</file>
+
+<file path=customXml/item2.xml><?xml version="1.0" encoding="utf-8"?>
 <ct:contentTypeSchema xmlns:ct="http://schemas.microsoft.com/office/2006/metadata/contentType" xmlns:ma="http://schemas.microsoft.com/office/2006/metadata/properties/metaAttributes" ct:_="" ma:_="" ma:contentTypeName="Document" ma:contentTypeID="0x010100565464437F680748A68B85EB6594EA7D" ma:contentTypeVersion="0" ma:contentTypeDescription="Create a new document." ma:contentTypeScope="" ma:versionID="fe3f4dd58d5914c51cfc6deaa8ad845c">
   <xsd:schema xmlns:xsd="http://www.w3.org/2001/XMLSchema" xmlns:p="http://schemas.microsoft.com/office/2006/metadata/properties" targetNamespace="http://schemas.microsoft.com/office/2006/metadata/properties" ma:root="true" ma:fieldsID="4aeb20c0e3442673af7ee10786458764">
     <xsd:element name="properties">
@@ -12680,12 +12901,6 @@
 </ct:contentTypeSchema>
 </file>
 
-<file path=customXml/item2.xml><?xml version="1.0" encoding="utf-8"?>
-<p:properties xmlns:p="http://schemas.microsoft.com/office/2006/metadata/properties" xmlns:xsi="http://www.w3.org/2001/XMLSchema-instance" xmlns:pc="http://schemas.microsoft.com/office/infopath/2007/PartnerControls">
-  <documentManagement/>
-</p:properties>
-</file>
-
 <file path=customXml/item3.xml><?xml version="1.0" encoding="utf-8"?>
 <?mso-contentType ?>
 <FormTemplates xmlns="http://schemas.microsoft.com/sharepoint/v3/contenttype/forms">
@@ -12696,6 +12911,21 @@
 </file>
 
 <file path=customXml/itemProps1.xml><?xml version="1.0" encoding="utf-8"?>
+<ds:datastoreItem xmlns:ds="http://schemas.openxmlformats.org/officeDocument/2006/customXml" ds:itemID="{A50EC660-24D0-43A0-AE5E-E274115E726B}">
+  <ds:schemaRefs>
+    <ds:schemaRef ds:uri="http://purl.org/dc/terms/"/>
+    <ds:schemaRef ds:uri="http://schemas.openxmlformats.org/package/2006/metadata/core-properties"/>
+    <ds:schemaRef ds:uri="http://schemas.microsoft.com/office/2006/documentManagement/types"/>
+    <ds:schemaRef ds:uri="http://purl.org/dc/elements/1.1/"/>
+    <ds:schemaRef ds:uri="http://schemas.microsoft.com/office/2006/metadata/properties"/>
+    <ds:schemaRef ds:uri="http://www.w3.org/XML/1998/namespace"/>
+    <ds:schemaRef ds:uri="http://purl.org/dc/dcmitype/"/>
+    <ds:schemaRef ds:uri="http://schemas.microsoft.com/office/infopath/2007/PartnerControls"/>
+  </ds:schemaRefs>
+</ds:datastoreItem>
+</file>
+
+<file path=customXml/itemProps2.xml><?xml version="1.0" encoding="utf-8"?>
 <ds:datastoreItem xmlns:ds="http://schemas.openxmlformats.org/officeDocument/2006/customXml" ds:itemID="{E8DB7DEB-074E-4EE8-9B6E-FD277323109C}">
   <ds:schemaRefs>
     <ds:schemaRef ds:uri="http://schemas.microsoft.com/office/2006/metadata/contentType"/>
@@ -12710,21 +12940,6 @@
 </ds:datastoreItem>
 </file>
 
-<file path=customXml/itemProps2.xml><?xml version="1.0" encoding="utf-8"?>
-<ds:datastoreItem xmlns:ds="http://schemas.openxmlformats.org/officeDocument/2006/customXml" ds:itemID="{A50EC660-24D0-43A0-AE5E-E274115E726B}">
-  <ds:schemaRefs>
-    <ds:schemaRef ds:uri="http://purl.org/dc/terms/"/>
-    <ds:schemaRef ds:uri="http://schemas.openxmlformats.org/package/2006/metadata/core-properties"/>
-    <ds:schemaRef ds:uri="http://schemas.microsoft.com/office/2006/documentManagement/types"/>
-    <ds:schemaRef ds:uri="http://purl.org/dc/elements/1.1/"/>
-    <ds:schemaRef ds:uri="http://schemas.microsoft.com/office/2006/metadata/properties"/>
-    <ds:schemaRef ds:uri="http://www.w3.org/XML/1998/namespace"/>
-    <ds:schemaRef ds:uri="http://purl.org/dc/dcmitype/"/>
-    <ds:schemaRef ds:uri="http://schemas.microsoft.com/office/infopath/2007/PartnerControls"/>
-  </ds:schemaRefs>
-</ds:datastoreItem>
-</file>
-
 <file path=customXml/itemProps3.xml><?xml version="1.0" encoding="utf-8"?>
 <ds:datastoreItem xmlns:ds="http://schemas.openxmlformats.org/officeDocument/2006/customXml" ds:itemID="{19E20559-B232-4371-8690-E3D8007EDB82}">
   <ds:schemaRefs>

</xml_diff>